<commit_message>
images replaced with url
</commit_message>
<xml_diff>
--- a/updated_presentation.pptx
+++ b/updated_presentation.pptx
@@ -938,7 +938,7 @@
                   <a:srgbClr val="FFFFFF"/>
                 </a:solidFill>
               </a:rPr>
-              <a:t>Meta introduces Llama 3, the next generation of its open-source large language model (LLM). This release features pretrained and instruction-fine-tuned models with 8B and 70B parameters, demonstrating state-of-the-art performance across benchmarks.  Llama 3 is available on various platforms, including AWS, Databricks, Google Cloud, and Hugging Face, with support from AMD, AWS, Dell, Intel, NVIDIA, and Qualcomm. Meta emphasizes responsible development and deployment, offering tools like Llama Guard 2, Code Shield, and CyberSec Eval 2 for safety. Future plans include introducing new capabilities, longer context windows, additional model sizes, and enhanced performance.</a:t>
+              <a:t>Meta Llama 3 is the next generation of our state-of-the-art open source large language model. It's available on various platforms including AWS, Databricks, Google Cloud, Hugging Face, Kaggle, IBM WatsonX, Microsoft Azure, NVIDIA NIM, and Snowflake. We're dedicated to developing Llama 3 responsibly, and offering resources to help others do the same. This includes Llama Guard 2, Code Shield, and CyberSec Eval 2 for trust and safety. In the coming months, we expect new capabilities, longer context windows, additional model sizes, and enhanced performance. The Llama 3 research paper will also be released soon.</a:t>
             </a:r>
             <a:endParaRPr kumimoji="0" lang="en-US" altLang="en-US" i="0" u="none" strike="noStrike" cap="none" normalizeH="0" baseline="0" dirty="0">
               <a:ln>
@@ -1017,7 +1017,7 @@
                   <a:srgbClr val="FFFFFF"/>
                 </a:solidFill>
               </a:rPr>
-              <a:t>Introducing Meta Llama 3: The Most Capable Openly Available LLM to Date by Karthik Avinash</a:t>
+              <a:t>Introducing Meta Llama 3: The Most Capable Openly Available LLM</a:t>
             </a:r>
             <a:endParaRPr lang="en-IN" dirty="0">
               <a:solidFill>
@@ -1061,7 +1061,7 @@
                   <a:srgbClr val="FFFFFF"/>
                 </a:solidFill>
               </a:rPr>
-              <a:t>Large Language Model (in short LLM)</a:t>
+              <a:t>Large Language Models</a:t>
             </a:r>
           </a:p>
         </p:txBody>
@@ -1174,7 +1174,7 @@
                   <a:srgbClr val="FFFFFF"/>
                 </a:solidFill>
               </a:rPr>
-              <a:t>Key Goals for Llama 3</a:t>
+              <a:t>Introducing Meta Llama 3</a:t>
             </a:r>
           </a:p>
         </p:txBody>
@@ -1212,7 +1212,7 @@
                   <a:srgbClr val="FFFFFF"/>
                 </a:solidFill>
               </a:rPr>
-              <a:t>Striving for Excellence and Responsibility</a:t>
+              <a:t>The Next Generation of Llama</a:t>
             </a:r>
             <a:endParaRPr lang="en-US" sz="1944" dirty="0">
               <a:solidFill>
@@ -1255,7 +1255,7 @@
                   <a:srgbClr val="FFFFFF"/>
                 </a:solidFill>
               </a:rPr>
-              <a:t>Build the Best Open Models</a:t>
+              <a:t>Llama 3 models are here!</a:t>
             </a:r>
           </a:p>
         </p:txBody>
@@ -1293,7 +1293,7 @@
                   <a:srgbClr val="FFFFFF"/>
                 </a:solidFill>
               </a:rPr>
-              <a:t>Meta aimed to develop Llama 3 models that rival the best proprietary LLMs in performance and helpfulness. The company embraced an open-source philosophy, releasing models early and often for community feedback.  The initial text-based models are just the start, with future plans to introduce multilingual and multimodal capabilities, longer context windows, and improved overall performance.</a:t>
+              <a:t>This release features pretrained and instruction-fine-tuned language models with 8B and 70B parameters, supporting a wide range of use cases. Llama 3 demonstrates state-of-the-art performance on various benchmarks and offers improved reasoning capabilities. We believe these are the best open source models of their class.</a:t>
             </a:r>
           </a:p>
           <a:p>
@@ -1330,6 +1330,85 @@
               <a:buNone/>
             </a:pPr>
             <a:endParaRPr lang="en-US" sz="1944" dirty="0">
+              <a:solidFill>
+                <a:schemeClr val="bg1"/>
+              </a:solidFill>
+            </a:endParaRPr>
+          </a:p>
+        </p:txBody>
+      </p:sp>
+      <p:sp>
+        <p:nvSpPr>
+          <p:cNvPr id="12" name="TextBox 11">
+            <a:extLst>
+              <a:ext uri="{FF2B5EF4-FFF2-40B4-BE49-F238E27FC236}">
+                <a16:creationId xmlns:a16="http://schemas.microsoft.com/office/drawing/2014/main" id="{E835B8CB-49DA-B0C3-AC18-6B6B5500D8B2}"/>
+              </a:ext>
+            </a:extLst>
+          </p:cNvPr>
+          <p:cNvSpPr txBox="1"/>
+          <p:nvPr/>
+        </p:nvSpPr>
+        <p:spPr>
+          <a:xfrm>
+            <a:off x="5799117" y="1676946"/>
+            <a:ext cx="2064723" cy="1754326"/>
+          </a:xfrm>
+          <a:prstGeom prst="rect">
+            <a:avLst/>
+          </a:prstGeom>
+          <a:noFill/>
+        </p:spPr>
+        <p:txBody>
+          <a:bodyPr wrap="square" rtlCol="0">
+            <a:spAutoFit/>
+          </a:bodyPr>
+          <a:lstStyle/>
+          <a:p>
+            <a:r>
+              <a:rPr u="sng">
+                <a:solidFill>
+                  <a:srgbClr val="0000FF"/>
+                </a:solidFill>
+              </a:rPr>
+              <a:t>https://encrypted-tbn0.gstatic.com/images?q=tbn:ANd9GcTr-AAfKLhwCwRnqg_umaasvtg7SDJvD3pN9g-BD_8xlo7c24c3zoLTnOBYum0&amp;s</a:t>
+            </a:r>
+            <a:endParaRPr lang="en-IN" dirty="0">
+              <a:solidFill>
+                <a:schemeClr val="bg1"/>
+              </a:solidFill>
+            </a:endParaRPr>
+          </a:p>
+          <a:p>
+            <a:endParaRPr lang="en-IN" dirty="0">
+              <a:solidFill>
+                <a:schemeClr val="bg1"/>
+              </a:solidFill>
+            </a:endParaRPr>
+          </a:p>
+          <a:p>
+            <a:endParaRPr lang="en-IN" dirty="0">
+              <a:solidFill>
+                <a:schemeClr val="bg1"/>
+              </a:solidFill>
+            </a:endParaRPr>
+          </a:p>
+          <a:p>
+            <a:endParaRPr lang="en-IN" dirty="0">
+              <a:solidFill>
+                <a:schemeClr val="bg1"/>
+              </a:solidFill>
+            </a:endParaRPr>
+          </a:p>
+          <a:p>
+            <a:endParaRPr lang="en-IN" dirty="0">
+              <a:solidFill>
+                <a:schemeClr val="bg1"/>
+              </a:solidFill>
+            </a:endParaRPr>
+          </a:p>
+          <a:p>
+            <a:endParaRPr lang="en-IN" dirty="0">
               <a:solidFill>
                 <a:schemeClr val="bg1"/>
               </a:solidFill>
@@ -1376,7 +1455,7 @@
                   <a:srgbClr val="FFFFFF"/>
                 </a:solidFill>
               </a:rPr>
-              <a:t>Address Developer Feedback</a:t>
+              <a:t>Llama 3 is open source.</a:t>
             </a:r>
           </a:p>
         </p:txBody>
@@ -1420,7 +1499,7 @@
                   <a:srgbClr val="FFFFFF"/>
                 </a:solidFill>
               </a:rPr>
-              <a:t>Meta actively sought feedback from developers to enhance Llama 3's usefulness.  The company also prioritizes responsible use, playing a leading role in promoting ethical LLM development and deployment.</a:t>
+              <a:t>We're putting Llama 3 in the hands of the community to kickstart the next wave of AI innovation across the stack—from applications to developer tools and more.</a:t>
             </a:r>
           </a:p>
         </p:txBody>
@@ -1464,7 +1543,7 @@
                   <a:srgbClr val="FFFFFF"/>
                 </a:solidFill>
               </a:rPr>
-              <a:t>Embrace Open Source Ethos</a:t>
+              <a:t>Why Llama 3?</a:t>
             </a:r>
           </a:p>
         </p:txBody>
@@ -1508,7 +1587,7 @@
                   <a:srgbClr val="FFFFFF"/>
                 </a:solidFill>
               </a:rPr>
-              <a:t>Meta believes in releasing early and often to empower the community and accelerate innovation. This approach allows developers to access models during development and contribute to their evolution. The company is committed to fostering an open ecosystem where collaboration thrives.</a:t>
+              <a:t>We aimed to build the best open models, matching the quality of proprietary models. We addressed developer feedback to improve Llama 3's helpfulness, prioritizing responsible use and deployment. We're embracing open source ethos by releasing early and often, allowing the community access to models in development.</a:t>
             </a:r>
           </a:p>
         </p:txBody>
@@ -1552,7 +1631,7 @@
                   <a:srgbClr val="FFFFFF"/>
                 </a:solidFill>
               </a:rPr>
-              <a:t>Future Plans for Llama 3</a:t>
+              <a:t>What's next?</a:t>
             </a:r>
           </a:p>
         </p:txBody>
@@ -1596,35 +1675,11 @@
                   <a:srgbClr val="FFFFFF"/>
                 </a:solidFill>
               </a:rPr>
-              <a:t>Meta envisions a future where Llama 3 becomes multilingual and multimodal, capable of understanding and responding to multiple languages and formats.  The company aims to extend its context window, allowing the model to process and analyze larger amounts of information.  Continuous performance improvements are planned across core LLM capabilities like reasoning and coding, pushing the boundaries of AI.</a:t>
+              <a:t>We'll make Llama 3 multilingual and multimodal, enhance its context length, and continue improving overall performance, including reasoning and coding abilities. Our goal is to empower the community with the best possible tools for AI innovation.</a:t>
             </a:r>
           </a:p>
         </p:txBody>
       </p:sp>
-      <p:pic>
-        <p:nvPicPr>
-          <p:cNvPr id="23" name="Picture 22" descr="image_8.jpg"/>
-          <p:cNvPicPr>
-            <a:picLocks noChangeAspect="1"/>
-          </p:cNvPicPr>
-          <p:nvPr/>
-        </p:nvPicPr>
-        <p:blipFill>
-          <a:blip r:embed="rId4"/>
-          <a:stretch>
-            <a:fillRect/>
-          </a:stretch>
-        </p:blipFill>
-        <p:spPr>
-          <a:xfrm>
-            <a:off x="5799117" y="1676946"/>
-            <a:ext cx="2064723" cy="1754326"/>
-          </a:xfrm>
-          <a:prstGeom prst="rect">
-            <a:avLst/>
-          </a:prstGeom>
-        </p:spPr>
-      </p:pic>
     </p:spTree>
   </p:cSld>
   <p:clrMapOvr>
@@ -1733,7 +1788,7 @@
                   <a:srgbClr val="FFFFFF"/>
                 </a:solidFill>
               </a:rPr>
-              <a:t>State-of-the-Art Performance</a:t>
+              <a:t>Llama 3 Performance</a:t>
             </a:r>
           </a:p>
         </p:txBody>
@@ -1771,7 +1826,7 @@
                   <a:srgbClr val="FFFFFF"/>
                 </a:solidFill>
               </a:rPr>
-              <a:t>Pushing the Boundaries of Language Modeling</a:t>
+              <a:t>State-of-the-Art Results Across Benchmarks</a:t>
             </a:r>
             <a:endParaRPr lang="en-US" sz="1768" dirty="0">
               <a:solidFill>
@@ -1891,7 +1946,7 @@
                   <a:srgbClr val="FFFFFF"/>
                 </a:solidFill>
               </a:rPr>
-              <a:t>Improved Pretraining &amp; Post-training</a:t>
+              <a:t>Llama 3 is a major leap.</a:t>
             </a:r>
           </a:p>
         </p:txBody>
@@ -1929,7 +1984,7 @@
                   <a:srgbClr val="FFFFFF"/>
                 </a:solidFill>
               </a:rPr>
-              <a:t>Llama 3's 8B and 70B parameter models surpass Llama 2, achieving a new standard in LLM performance. Advanced pretraining and post-training techniques have yielded significant improvements, leading to the best available models at those scales. False refusal rates have been reduced, alignment enhanced, and response diversity increased.  Enhanced capabilities, including reasoning, code generation, and instruction following, make Llama 3 more steerable and responsive.</a:t>
+              <a:t>Our 8B and 70B parameter Llama 3 models outperform Llama 2 and set a new standard for LLMs at those scales. Improvements in pretraining and post-training have made our pretrained and instruction-fine-tuned models the best at their respective sizes. These improvements have also led to reduced false refusal rates, enhanced alignment, and increased diversity in model responses.</a:t>
             </a:r>
           </a:p>
         </p:txBody>
@@ -2044,7 +2099,7 @@
                   <a:srgbClr val="FFFFFF"/>
                 </a:solidFill>
               </a:rPr>
-              <a:t>Human Evaluation Benchmark</a:t>
+              <a:t>Human evaluations confirm.</a:t>
             </a:r>
           </a:p>
         </p:txBody>
@@ -2082,7 +2137,7 @@
                   <a:srgbClr val="FFFFFF"/>
                 </a:solidFill>
               </a:rPr>
-              <a:t>Meta created a high-quality human evaluation set encompassing 12 key use cases, including coding, writing, and reasoning. The 70B instruction-following model outperforms Claude Sonnet, Mistral Medium, and GPT-3.5 in real-world scenarios, as assessed by human annotators.  The pretrained model also sets a new benchmark for LLMs at its scale.</a:t>
+              <a:t>We've developed a new high-quality human evaluation set covering 12 key use cases. Our 70B instruction-following model consistently outperforms competing models of similar size in real-world scenarios. The chart below shows aggregated results of human evaluations against Claude Sonnet, Mistral Medium, and GPT-3.5, highlighting Llama 3's strength in real-world tasks.</a:t>
             </a:r>
           </a:p>
         </p:txBody>
@@ -2197,7 +2252,7 @@
                   <a:srgbClr val="FFFFFF"/>
                 </a:solidFill>
               </a:rPr>
-              <a:t>Performance in Real-World Scenarios</a:t>
+              <a:t>Focus on real-world use cases.</a:t>
             </a:r>
           </a:p>
         </p:txBody>
@@ -2235,25 +2290,23 @@
                   <a:srgbClr val="FFFFFF"/>
                 </a:solidFill>
               </a:rPr>
-              <a:t>Llama 3 was evaluated not just on standard benchmarks but also for real-world performance. The evaluation set was carefully curated to assess the model's ability to handle diverse prompts and tasks.  Human evaluators consistently favored the 70B instruction-following model over competitors, showcasing its strength in practical scenarios.</a:t>
+              <a:t>We evaluated Llama 3 on standard benchmarks and developed a new high-quality human evaluation set, containing 1,800 prompts across 12 key use cases. This set helps assess real-world performance. For improved model safety, even our own modeling teams don't have access to this evaluation set, ensuring that Llama 3 isn't overfitting to it. The chart below shows human evaluation results for Llama 3 against comparable models.</a:t>
             </a:r>
           </a:p>
         </p:txBody>
       </p:sp>
-      <p:pic>
-        <p:nvPicPr>
-          <p:cNvPr id="20" name="Picture 19" descr="image_23.jpg"/>
-          <p:cNvPicPr>
-            <a:picLocks noChangeAspect="1"/>
-          </p:cNvPicPr>
-          <p:nvPr/>
-        </p:nvPicPr>
-        <p:blipFill>
-          <a:blip r:embed="rId4"/>
-          <a:stretch>
-            <a:fillRect/>
-          </a:stretch>
-        </p:blipFill>
+      <p:sp>
+        <p:nvSpPr>
+          <p:cNvPr id="4" name="TextBox 3">
+            <a:extLst>
+              <a:ext uri="{FF2B5EF4-FFF2-40B4-BE49-F238E27FC236}">
+                <a16:creationId xmlns:a16="http://schemas.microsoft.com/office/drawing/2014/main" id="{78A3BF24-1B37-C355-216B-A51563389A80}"/>
+              </a:ext>
+            </a:extLst>
+          </p:cNvPr>
+          <p:cNvSpPr txBox="1"/>
+          <p:nvPr/>
+        </p:nvSpPr>
         <p:spPr>
           <a:xfrm>
             <a:off x="9876493" y="524392"/>
@@ -2262,8 +2315,86 @@
           <a:prstGeom prst="rect">
             <a:avLst/>
           </a:prstGeom>
-        </p:spPr>
-      </p:pic>
+          <a:noFill/>
+        </p:spPr>
+        <p:txBody>
+          <a:bodyPr wrap="square" rtlCol="0">
+            <a:spAutoFit/>
+          </a:bodyPr>
+          <a:lstStyle/>
+          <a:p>
+            <a:r>
+              <a:rPr u="sng">
+                <a:solidFill>
+                  <a:srgbClr val="0000FF"/>
+                </a:solidFill>
+              </a:rPr>
+              <a:t>https://encrypted-tbn0.gstatic.com/images?q=tbn:ANd9GcQ8XaOniGFjHrxYnjX8sghabxcvV34Hc3tfvY1g9-KsQgewMBhYG6hWWiFG3wg&amp;s</a:t>
+            </a:r>
+            <a:endParaRPr lang="en-IN" dirty="0">
+              <a:solidFill>
+                <a:schemeClr val="bg1"/>
+              </a:solidFill>
+            </a:endParaRPr>
+          </a:p>
+          <a:p>
+            <a:endParaRPr lang="en-IN" dirty="0">
+              <a:solidFill>
+                <a:schemeClr val="bg1"/>
+              </a:solidFill>
+            </a:endParaRPr>
+          </a:p>
+          <a:p>
+            <a:endParaRPr lang="en-IN" dirty="0">
+              <a:solidFill>
+                <a:schemeClr val="bg1"/>
+              </a:solidFill>
+            </a:endParaRPr>
+          </a:p>
+          <a:p>
+            <a:endParaRPr lang="en-IN" dirty="0">
+              <a:solidFill>
+                <a:schemeClr val="bg1"/>
+              </a:solidFill>
+            </a:endParaRPr>
+          </a:p>
+          <a:p>
+            <a:endParaRPr lang="en-IN" dirty="0">
+              <a:solidFill>
+                <a:schemeClr val="bg1"/>
+              </a:solidFill>
+            </a:endParaRPr>
+          </a:p>
+          <a:p>
+            <a:endParaRPr lang="en-IN" dirty="0">
+              <a:solidFill>
+                <a:schemeClr val="bg1"/>
+              </a:solidFill>
+            </a:endParaRPr>
+          </a:p>
+          <a:p>
+            <a:endParaRPr lang="en-IN" dirty="0">
+              <a:solidFill>
+                <a:schemeClr val="bg1"/>
+              </a:solidFill>
+            </a:endParaRPr>
+          </a:p>
+          <a:p>
+            <a:endParaRPr lang="en-IN" dirty="0">
+              <a:solidFill>
+                <a:schemeClr val="bg1"/>
+              </a:solidFill>
+            </a:endParaRPr>
+          </a:p>
+          <a:p>
+            <a:endParaRPr lang="en-IN" dirty="0">
+              <a:solidFill>
+                <a:schemeClr val="bg1"/>
+              </a:solidFill>
+            </a:endParaRPr>
+          </a:p>
+        </p:txBody>
+      </p:sp>
     </p:spTree>
   </p:cSld>
   <p:clrMapOvr>

</xml_diff>

<commit_message>
edited the estimated words for image, title and stitle
</commit_message>
<xml_diff>
--- a/updated_presentation.pptx
+++ b/updated_presentation.pptx
@@ -938,7 +938,7 @@
                   <a:srgbClr val="FFFFFF"/>
                 </a:solidFill>
               </a:rPr>
-              <a:t>Meta Llama 3 is the next generation of our state-of-the-art open source large language model. It's available on various platforms including AWS, Databricks, Google Cloud, Hugging Face, Kaggle, IBM WatsonX, Microsoft Azure, NVIDIA NIM, and Snowflake. We're dedicated to developing Llama 3 responsibly, and offering resources to help others do the same. This includes Llama Guard 2, Code Shield, and CyberSec Eval 2 for trust and safety. In the coming months, we expect new capabilities, longer context windows, additional model sizes, and enhanced performance. The Llama 3 research paper will also be released soon.</a:t>
+              <a:t>Introducing Meta Llama 3, the most capable openly available LLM to date. This next-generation language model offers significant advancements over previous versions, including improved reasoning capabilities and performance across a wide range of benchmarks. Available across major platforms, Llama 3 is poised to empower developers and drive innovation in the field of AI.</a:t>
             </a:r>
             <a:endParaRPr kumimoji="0" lang="en-US" altLang="en-US" i="0" u="none" strike="noStrike" cap="none" normalizeH="0" baseline="0" dirty="0">
               <a:ln>
@@ -1017,7 +1017,7 @@
                   <a:srgbClr val="FFFFFF"/>
                 </a:solidFill>
               </a:rPr>
-              <a:t>Introducing Meta Llama 3: The Most Capable Openly Available LLM</a:t>
+              <a:t>The Future of Open Source LLMs</a:t>
             </a:r>
             <a:endParaRPr lang="en-IN" dirty="0">
               <a:solidFill>
@@ -1061,7 +1061,7 @@
                   <a:srgbClr val="FFFFFF"/>
                 </a:solidFill>
               </a:rPr>
-              <a:t>Large Language Models</a:t>
+              <a:t>Meta Llama 3</a:t>
             </a:r>
           </a:p>
         </p:txBody>
@@ -1174,7 +1174,7 @@
                   <a:srgbClr val="FFFFFF"/>
                 </a:solidFill>
               </a:rPr>
-              <a:t>Introducing Meta Llama 3</a:t>
+              <a:t>Key Highlights</a:t>
             </a:r>
           </a:p>
         </p:txBody>
@@ -1212,7 +1212,7 @@
                   <a:srgbClr val="FFFFFF"/>
                 </a:solidFill>
               </a:rPr>
-              <a:t>The Next Generation of Llama</a:t>
+              <a:t>State-of-the-art Performance</a:t>
             </a:r>
             <a:endParaRPr lang="en-US" sz="1944" dirty="0">
               <a:solidFill>
@@ -1255,7 +1255,7 @@
                   <a:srgbClr val="FFFFFF"/>
                 </a:solidFill>
               </a:rPr>
-              <a:t>Llama 3 models are here!</a:t>
+              <a:t>Llama 3 surpasses its predecessor, Llama 2, establishing a new benchmark for LLMs at its scale.</a:t>
             </a:r>
           </a:p>
         </p:txBody>
@@ -1293,7 +1293,7 @@
                   <a:srgbClr val="FFFFFF"/>
                 </a:solidFill>
               </a:rPr>
-              <a:t>This release features pretrained and instruction-fine-tuned language models with 8B and 70B parameters, supporting a wide range of use cases. Llama 3 demonstrates state-of-the-art performance on various benchmarks and offers improved reasoning capabilities. We believe these are the best open source models of their class.</a:t>
+              <a:t>Extensive training on a massive dataset, combined with innovative post-training techniques, resulted in significantly enhanced model capabilities, including reasoning, code generation, and instruction following.</a:t>
             </a:r>
           </a:p>
           <a:p>
@@ -1371,7 +1371,7 @@
                   <a:srgbClr val="0000FF"/>
                 </a:solidFill>
               </a:rPr>
-              <a:t>https://encrypted-tbn0.gstatic.com/images?q=tbn:ANd9GcTr-AAfKLhwCwRnqg_umaasvtg7SDJvD3pN9g-BD_8xlo7c24c3zoLTnOBYum0&amp;s</a:t>
+              <a:t>https://encrypted-tbn0.gstatic.com/images?q=tbn:ANd9GcSSBnFJIJYoSIC4VWLhcjA3cZxqtaerQ6z_mBaOg_mdISNyvSBVZcSDzSAAAmQ&amp;s</a:t>
             </a:r>
             <a:endParaRPr lang="en-IN" dirty="0">
               <a:solidFill>
@@ -1455,7 +1455,7 @@
                   <a:srgbClr val="FFFFFF"/>
                 </a:solidFill>
               </a:rPr>
-              <a:t>Llama 3 is open source.</a:t>
+              <a:t>Open Source Approach</a:t>
             </a:r>
           </a:p>
         </p:txBody>
@@ -1499,7 +1499,7 @@
                   <a:srgbClr val="FFFFFF"/>
                 </a:solidFill>
               </a:rPr>
-              <a:t>We're putting Llama 3 in the hands of the community to kickstart the next wave of AI innovation across the stack—from applications to developer tools and more.</a:t>
+              <a:t>Meta's commitment to open source principles has made Llama 3 accessible to a broader community of developers, fostering innovation and collaboration in the field.</a:t>
             </a:r>
           </a:p>
         </p:txBody>
@@ -1543,7 +1543,7 @@
                   <a:srgbClr val="FFFFFF"/>
                 </a:solidFill>
               </a:rPr>
-              <a:t>Why Llama 3?</a:t>
+              <a:t>Availability &amp; Platforms</a:t>
             </a:r>
           </a:p>
         </p:txBody>
@@ -1587,7 +1587,7 @@
                   <a:srgbClr val="FFFFFF"/>
                 </a:solidFill>
               </a:rPr>
-              <a:t>We aimed to build the best open models, matching the quality of proprietary models. We addressed developer feedback to improve Llama 3's helpfulness, prioritizing responsible use and deployment. We're embracing open source ethos by releasing early and often, allowing the community access to models in development.</a:t>
+              <a:t>Llama 3 is readily available on leading cloud platforms, model API providers, and other key infrastructure, ensuring its accessibility and widespread adoption.</a:t>
             </a:r>
           </a:p>
         </p:txBody>
@@ -1631,7 +1631,7 @@
                   <a:srgbClr val="FFFFFF"/>
                 </a:solidFill>
               </a:rPr>
-              <a:t>What's next?</a:t>
+              <a:t>Responsible AI Development</a:t>
             </a:r>
           </a:p>
         </p:txBody>
@@ -1675,7 +1675,7 @@
                   <a:srgbClr val="FFFFFF"/>
                 </a:solidFill>
               </a:rPr>
-              <a:t>We'll make Llama 3 multilingual and multimodal, enhance its context length, and continue improving overall performance, including reasoning and coding abilities. Our goal is to empower the community with the best possible tools for AI innovation.</a:t>
+              <a:t>Meta prioritizes responsible AI development, implementing robust safeguards and guidelines to mitigate potential risks associated with LLM usage. Tools like Llama Guard 2 and Code Shield enhance safety and ensure ethical deployment.</a:t>
             </a:r>
           </a:p>
         </p:txBody>
@@ -1788,7 +1788,7 @@
                   <a:srgbClr val="FFFFFF"/>
                 </a:solidFill>
               </a:rPr>
-              <a:t>Llama 3 Performance</a:t>
+              <a:t>Behind the Breakthrough</a:t>
             </a:r>
           </a:p>
         </p:txBody>
@@ -1826,7 +1826,7 @@
                   <a:srgbClr val="FFFFFF"/>
                 </a:solidFill>
               </a:rPr>
-              <a:t>State-of-the-Art Results Across Benchmarks</a:t>
+              <a:t>Training &amp; Architecture</a:t>
             </a:r>
             <a:endParaRPr lang="en-US" sz="1768" dirty="0">
               <a:solidFill>
@@ -1946,7 +1946,7 @@
                   <a:srgbClr val="FFFFFF"/>
                 </a:solidFill>
               </a:rPr>
-              <a:t>Llama 3 is a major leap.</a:t>
+              <a:t>Model Architecture</a:t>
             </a:r>
           </a:p>
         </p:txBody>
@@ -1984,7 +1984,7 @@
                   <a:srgbClr val="FFFFFF"/>
                 </a:solidFill>
               </a:rPr>
-              <a:t>Our 8B and 70B parameter Llama 3 models outperform Llama 2 and set a new standard for LLMs at those scales. Improvements in pretraining and post-training have made our pretrained and instruction-fine-tuned models the best at their respective sizes. These improvements have also led to reduced false refusal rates, enhanced alignment, and increased diversity in model responses.</a:t>
+              <a:t>Llama 3 leverages a decoder-only transformer architecture with key improvements, including a larger vocabulary tokenizer for efficient language encoding and grouped query attention (GQA) for enhanced inference efficiency.</a:t>
             </a:r>
           </a:p>
         </p:txBody>
@@ -2099,7 +2099,7 @@
                   <a:srgbClr val="FFFFFF"/>
                 </a:solidFill>
               </a:rPr>
-              <a:t>Human evaluations confirm.</a:t>
+              <a:t>Training Data</a:t>
             </a:r>
           </a:p>
         </p:txBody>
@@ -2137,7 +2137,7 @@
                   <a:srgbClr val="FFFFFF"/>
                 </a:solidFill>
               </a:rPr>
-              <a:t>We've developed a new high-quality human evaluation set covering 12 key use cases. Our 70B instruction-following model consistently outperforms competing models of similar size in real-world scenarios. The chart below shows aggregated results of human evaluations against Claude Sonnet, Mistral Medium, and GPT-3.5, highlighting Llama 3's strength in real-world tasks.</a:t>
+              <a:t>The model was trained on an extensive dataset of over 15T tokens, encompassing a diverse range of publicly available sources, including a significant amount of code. This vast dataset, combined with rigorous data filtering and curation processes, ensures high-quality training data.</a:t>
             </a:r>
           </a:p>
         </p:txBody>
@@ -2252,7 +2252,7 @@
                   <a:srgbClr val="FFFFFF"/>
                 </a:solidFill>
               </a:rPr>
-              <a:t>Focus on real-world use cases.</a:t>
+              <a:t>Scaling Up Training</a:t>
             </a:r>
           </a:p>
         </p:txBody>
@@ -2290,7 +2290,7 @@
                   <a:srgbClr val="FFFFFF"/>
                 </a:solidFill>
               </a:rPr>
-              <a:t>We evaluated Llama 3 on standard benchmarks and developed a new high-quality human evaluation set, containing 1,800 prompts across 12 key use cases. This set helps assess real-world performance. For improved model safety, even our own modeling teams don't have access to this evaluation set, ensuring that Llama 3 isn't overfitting to it. The chart below shows human evaluation results for Llama 3 against comparable models.</a:t>
+              <a:t>Meta's commitment to scaling up training involved employing advanced parallelization techniques, resulting in significant improvements in training efficiency and compute utilization. These optimizations allowed for the training of larger models with greater accuracy and performance.</a:t>
             </a:r>
           </a:p>
         </p:txBody>
@@ -2329,7 +2329,7 @@
                   <a:srgbClr val="0000FF"/>
                 </a:solidFill>
               </a:rPr>
-              <a:t>https://encrypted-tbn0.gstatic.com/images?q=tbn:ANd9GcQ8XaOniGFjHrxYnjX8sghabxcvV34Hc3tfvY1g9-KsQgewMBhYG6hWWiFG3wg&amp;s</a:t>
+              <a:t>https://encrypted-tbn0.gstatic.com/images?q=tbn:ANd9GcSuID-grn03Ldol_ZqSQZsP1CB-4frX6z80H3XyoSoU-tD075dCaG2PEN0peg&amp;s</a:t>
             </a:r>
             <a:endParaRPr lang="en-IN" dirty="0">
               <a:solidFill>

</xml_diff>

<commit_message>
prompt utility for topic preference
</commit_message>
<xml_diff>
--- a/updated_presentation.pptx
+++ b/updated_presentation.pptx
@@ -938,7 +938,7 @@
                   <a:srgbClr val="FFFFFF"/>
                 </a:solidFill>
               </a:rPr>
-              <a:t>Introducing Meta Llama 3, the most capable openly available LLM to date. This next-generation language model offers significant advancements over previous versions, including improved reasoning capabilities and performance across a wide range of benchmarks. Available across major platforms, Llama 3 is poised to empower developers and drive innovation in the field of AI.</a:t>
+              <a:t>Introducing Meta Llama 3: The Most Capable Openly Available LLM to Date\n\nMeta Llama 3 is the next generation of our state-of-the-art open source large language model. It is now available on major cloud platforms and hardware platforms.\n\nWe are dedicated to developing Llama 3 responsibly and are introducing new trust and safety tools to help others use it responsibly as well. These tools include Llama Guard 2, Code Shield, and CyberSec Eval 2.\n\nIn the coming months, we expect to introduce new capabilities, longer context windows, additional model sizes, and enhanced performance, and we’ll share the Llama 3 research paper. </a:t>
             </a:r>
             <a:endParaRPr kumimoji="0" lang="en-US" altLang="en-US" i="0" u="none" strike="noStrike" cap="none" normalizeH="0" baseline="0" dirty="0">
               <a:ln>
@@ -1017,7 +1017,7 @@
                   <a:srgbClr val="FFFFFF"/>
                 </a:solidFill>
               </a:rPr>
-              <a:t>The Future of Open Source LLMs</a:t>
+              <a:t>Llama 3:  A New Era of Open LLMs</a:t>
             </a:r>
             <a:endParaRPr lang="en-IN" dirty="0">
               <a:solidFill>
@@ -1061,7 +1061,7 @@
                   <a:srgbClr val="FFFFFF"/>
                 </a:solidFill>
               </a:rPr>
-              <a:t>Meta Llama 3</a:t>
+              <a:t>Llama 3 Architecture</a:t>
             </a:r>
           </a:p>
         </p:txBody>
@@ -1174,7 +1174,7 @@
                   <a:srgbClr val="FFFFFF"/>
                 </a:solidFill>
               </a:rPr>
-              <a:t>Key Highlights</a:t>
+              <a:t>Llama 3:  The Evolution</a:t>
             </a:r>
           </a:p>
         </p:txBody>
@@ -1212,7 +1212,7 @@
                   <a:srgbClr val="FFFFFF"/>
                 </a:solidFill>
               </a:rPr>
-              <a:t>State-of-the-art Performance</a:t>
+              <a:t>Building upon Llama 2</a:t>
             </a:r>
             <a:endParaRPr lang="en-US" sz="1944" dirty="0">
               <a:solidFill>
@@ -1255,7 +1255,7 @@
                   <a:srgbClr val="FFFFFF"/>
                 </a:solidFill>
               </a:rPr>
-              <a:t>Llama 3 surpasses its predecessor, Llama 2, establishing a new benchmark for LLMs at its scale.</a:t>
+              <a:t>Llama 3 builds upon the success of Llama 2, addressing developer feedback and enhancing its capabilities.</a:t>
             </a:r>
           </a:p>
         </p:txBody>
@@ -1293,7 +1293,7 @@
                   <a:srgbClr val="FFFFFF"/>
                 </a:solidFill>
               </a:rPr>
-              <a:t>Extensive training on a massive dataset, combined with innovative post-training techniques, resulted in significantly enhanced model capabilities, including reasoning, code generation, and instruction following.</a:t>
+              <a:t>Key improvements include: \n\n  Increased helpfulness:  Llama 3 aims to be even more helpful and responsive to user queries.\n  State-of-the-art performance: Llama 3 sets a new benchmark for LLMs at its size.\n  Responsible use: Meta prioritizes responsible development and deployment of Llama 3. </a:t>
             </a:r>
           </a:p>
           <a:p>
@@ -1371,7 +1371,7 @@
                   <a:srgbClr val="0000FF"/>
                 </a:solidFill>
               </a:rPr>
-              <a:t>https://encrypted-tbn0.gstatic.com/images?q=tbn:ANd9GcSSBnFJIJYoSIC4VWLhcjA3cZxqtaerQ6z_mBaOg_mdISNyvSBVZcSDzSAAAmQ&amp;s</a:t>
+              <a:t>https://encrypted-tbn0.gstatic.com/images?q=tbn:ANd9GcReK42oUp2KxxKz8emRIuRVNkYE7S18fYB4O_e8Ku7urQH8diqLjaQm5VBFrg&amp;s</a:t>
             </a:r>
             <a:endParaRPr lang="en-IN" dirty="0">
               <a:solidFill>
@@ -1455,7 +1455,7 @@
                   <a:srgbClr val="FFFFFF"/>
                 </a:solidFill>
               </a:rPr>
-              <a:t>Open Source Approach</a:t>
+              <a:t>Llama 3:  A Community Effort</a:t>
             </a:r>
           </a:p>
         </p:txBody>
@@ -1499,7 +1499,7 @@
                   <a:srgbClr val="FFFFFF"/>
                 </a:solidFill>
               </a:rPr>
-              <a:t>Meta's commitment to open source principles has made Llama 3 accessible to a broader community of developers, fostering innovation and collaboration in the field.</a:t>
+              <a:t>Meta believes in an open approach to AI development.  Llama 3 is released under an open license, encouraging innovation and collaboration.</a:t>
             </a:r>
           </a:p>
         </p:txBody>
@@ -1543,7 +1543,7 @@
                   <a:srgbClr val="FFFFFF"/>
                 </a:solidFill>
               </a:rPr>
-              <a:t>Availability &amp; Platforms</a:t>
+              <a:t>Llama 3 Goals</a:t>
             </a:r>
           </a:p>
         </p:txBody>
@@ -1587,7 +1587,7 @@
                   <a:srgbClr val="FFFFFF"/>
                 </a:solidFill>
               </a:rPr>
-              <a:t>Llama 3 is readily available on leading cloud platforms, model API providers, and other key infrastructure, ensuring its accessibility and widespread adoption.</a:t>
+              <a:t>Meta's goals for Llama 3 are:\n\n  Build the best open LLMs:  To rival proprietary models in performance and capability.\n  Address developer feedback: To improve the overall helpfulness and usability of Llama 3.\n  Lead in responsible AI: To promote the ethical and safe use of LLMs. </a:t>
             </a:r>
           </a:p>
         </p:txBody>
@@ -1631,7 +1631,7 @@
                   <a:srgbClr val="FFFFFF"/>
                 </a:solidFill>
               </a:rPr>
-              <a:t>Responsible AI Development</a:t>
+              <a:t>Future of Llama 3</a:t>
             </a:r>
           </a:p>
         </p:txBody>
@@ -1675,7 +1675,7 @@
                   <a:srgbClr val="FFFFFF"/>
                 </a:solidFill>
               </a:rPr>
-              <a:t>Meta prioritizes responsible AI development, implementing robust safeguards and guidelines to mitigate potential risks associated with LLM usage. Tools like Llama Guard 2 and Code Shield enhance safety and ensure ethical deployment.</a:t>
+              <a:t>Meta plans to expand Llama 3 in the future by adding:\n\n  Multilingual support\n  Multimodal capabilities\n  Longer context windows\n  Continual performance improvements  </a:t>
             </a:r>
           </a:p>
         </p:txBody>
@@ -1788,7 +1788,7 @@
                   <a:srgbClr val="FFFFFF"/>
                 </a:solidFill>
               </a:rPr>
-              <a:t>Behind the Breakthrough</a:t>
+              <a:t>Llama 3 Architecture</a:t>
             </a:r>
           </a:p>
         </p:txBody>
@@ -1826,7 +1826,7 @@
                   <a:srgbClr val="FFFFFF"/>
                 </a:solidFill>
               </a:rPr>
-              <a:t>Training &amp; Architecture</a:t>
+              <a:t>Key Design Components</a:t>
             </a:r>
             <a:endParaRPr lang="en-US" sz="1768" dirty="0">
               <a:solidFill>
@@ -1946,7 +1946,7 @@
                   <a:srgbClr val="FFFFFF"/>
                 </a:solidFill>
               </a:rPr>
-              <a:t>Model Architecture</a:t>
+              <a:t>Decoder-Only Transformer Architecture</a:t>
             </a:r>
           </a:p>
         </p:txBody>
@@ -1984,7 +1984,7 @@
                   <a:srgbClr val="FFFFFF"/>
                 </a:solidFill>
               </a:rPr>
-              <a:t>Llama 3 leverages a decoder-only transformer architecture with key improvements, including a larger vocabulary tokenizer for efficient language encoding and grouped query attention (GQA) for enhanced inference efficiency.</a:t>
+              <a:t>Llama 3 utilizes a standard decoder-only transformer architecture with key improvements: \n\n  Larger Vocabulary: A 128K token vocabulary for more efficient language encoding.\n  Grouped Query Attention (GQA): Enhances inference efficiency across 8B and 70B models.\n  Longer Sequence Length: Trained on 8,192 tokens, enabling processing of larger inputs.</a:t>
             </a:r>
           </a:p>
         </p:txBody>
@@ -2137,7 +2137,7 @@
                   <a:srgbClr val="FFFFFF"/>
                 </a:solidFill>
               </a:rPr>
-              <a:t>The model was trained on an extensive dataset of over 15T tokens, encompassing a diverse range of publicly available sources, including a significant amount of code. This vast dataset, combined with rigorous data filtering and curation processes, ensures high-quality training data.</a:t>
+              <a:t>Llama 3 is trained on a massive dataset of 15T tokens. This data includes:\n\n  Publicly Available Sources:  Diverse range of text and code.\n  Multilingual Data: Over 30 languages are included, supporting future multilingual use cases.\n  Rigorous Data Filtering:  Multiple pipelines ensure high-quality data.</a:t>
             </a:r>
           </a:p>
         </p:txBody>
@@ -2252,7 +2252,7 @@
                   <a:srgbClr val="FFFFFF"/>
                 </a:solidFill>
               </a:rPr>
-              <a:t>Scaling Up Training</a:t>
+              <a:t>Scaling Up Pretraining</a:t>
             </a:r>
           </a:p>
         </p:txBody>
@@ -2290,7 +2290,7 @@
                   <a:srgbClr val="FFFFFF"/>
                 </a:solidFill>
               </a:rPr>
-              <a:t>Meta's commitment to scaling up training involved employing advanced parallelization techniques, resulting in significant improvements in training efficiency and compute utilization. These optimizations allowed for the training of larger models with greater accuracy and performance.</a:t>
+              <a:t>To optimize training, Meta developed scaling laws to guide the training process. This included:\n\n  Data Mix Optimization: Selecting the best data mix for various use cases.\n  Efficient Compute Utilization:  Maximizing GPU uptime and reducing training time.\n  Predicting Performance:  Evaluating model performance on key tasks before training.</a:t>
             </a:r>
           </a:p>
         </p:txBody>
@@ -2329,7 +2329,7 @@
                   <a:srgbClr val="0000FF"/>
                 </a:solidFill>
               </a:rPr>
-              <a:t>https://encrypted-tbn0.gstatic.com/images?q=tbn:ANd9GcSuID-grn03Ldol_ZqSQZsP1CB-4frX6z80H3XyoSoU-tD075dCaG2PEN0peg&amp;s</a:t>
+              <a:t>https://encrypted-tbn0.gstatic.com/images?q=tbn:ANd9GcRBh9MD4mrBwyjZS1NVZJremFWjagQZs7jORk22qaLxuOSOQq9sX3zc8gqnLQ&amp;s</a:t>
             </a:r>
             <a:endParaRPr lang="en-IN" dirty="0">
               <a:solidFill>

</xml_diff>